<commit_message>
Updated as per progress in course
</commit_message>
<xml_diff>
--- a/Documentation/Analysis/LinuxInvestigation.pptx
+++ b/Documentation/Analysis/LinuxInvestigation.pptx
@@ -17,7 +17,16 @@
     <p:sldId id="265" r:id="rId11"/>
     <p:sldId id="266" r:id="rId12"/>
     <p:sldId id="267" r:id="rId13"/>
-    <p:sldId id="268" r:id="rId14"/>
+    <p:sldId id="269" r:id="rId14"/>
+    <p:sldId id="270" r:id="rId15"/>
+    <p:sldId id="268" r:id="rId16"/>
+    <p:sldId id="271" r:id="rId17"/>
+    <p:sldId id="272" r:id="rId18"/>
+    <p:sldId id="273" r:id="rId19"/>
+    <p:sldId id="274" r:id="rId20"/>
+    <p:sldId id="276" r:id="rId21"/>
+    <p:sldId id="277" r:id="rId22"/>
+    <p:sldId id="275" r:id="rId23"/>
   </p:sldIdLst>
   <p:sldSz cx="12192000" cy="6858000"/>
   <p:notesSz cx="6858000" cy="9144000"/>
@@ -4606,6 +4615,126 @@
           <p:cNvPr id="4" name="Picture 3">
             <a:extLst>
               <a:ext uri="{FF2B5EF4-FFF2-40B4-BE49-F238E27FC236}">
+                <a16:creationId xmlns:a16="http://schemas.microsoft.com/office/drawing/2014/main" id="{0D2A0093-EB81-4768-A05E-07E1AEE66AA7}"/>
+              </a:ext>
+            </a:extLst>
+          </p:cNvPr>
+          <p:cNvPicPr>
+            <a:picLocks noChangeAspect="1"/>
+          </p:cNvPicPr>
+          <p:nvPr/>
+        </p:nvPicPr>
+        <p:blipFill>
+          <a:blip r:embed="rId2"/>
+          <a:stretch>
+            <a:fillRect/>
+          </a:stretch>
+        </p:blipFill>
+        <p:spPr>
+          <a:xfrm>
+            <a:off x="1685925" y="1743075"/>
+            <a:ext cx="8820150" cy="3371850"/>
+          </a:xfrm>
+          <a:prstGeom prst="rect">
+            <a:avLst/>
+          </a:prstGeom>
+        </p:spPr>
+      </p:pic>
+    </p:spTree>
+    <p:extLst>
+      <p:ext uri="{BB962C8B-B14F-4D97-AF65-F5344CB8AC3E}">
+        <p14:creationId xmlns:p14="http://schemas.microsoft.com/office/powerpoint/2010/main" val="4081129697"/>
+      </p:ext>
+    </p:extLst>
+  </p:cSld>
+  <p:clrMapOvr>
+    <a:masterClrMapping/>
+  </p:clrMapOvr>
+</p:sld>
+</file>
+
+<file path=ppt/slides/slide14.xml><?xml version="1.0" encoding="utf-8"?>
+<p:sld xmlns:a="http://schemas.openxmlformats.org/drawingml/2006/main" xmlns:r="http://schemas.openxmlformats.org/officeDocument/2006/relationships" xmlns:p="http://schemas.openxmlformats.org/presentationml/2006/main">
+  <p:cSld>
+    <p:spTree>
+      <p:nvGrpSpPr>
+        <p:cNvPr id="1" name=""/>
+        <p:cNvGrpSpPr/>
+        <p:nvPr/>
+      </p:nvGrpSpPr>
+      <p:grpSpPr>
+        <a:xfrm>
+          <a:off x="0" y="0"/>
+          <a:ext cx="0" cy="0"/>
+          <a:chOff x="0" y="0"/>
+          <a:chExt cx="0" cy="0"/>
+        </a:xfrm>
+      </p:grpSpPr>
+      <p:pic>
+        <p:nvPicPr>
+          <p:cNvPr id="4" name="Picture 3">
+            <a:extLst>
+              <a:ext uri="{FF2B5EF4-FFF2-40B4-BE49-F238E27FC236}">
+                <a16:creationId xmlns:a16="http://schemas.microsoft.com/office/drawing/2014/main" id="{BEF6D498-E08C-4A3F-8906-7788A17AC5E1}"/>
+              </a:ext>
+            </a:extLst>
+          </p:cNvPr>
+          <p:cNvPicPr>
+            <a:picLocks noChangeAspect="1"/>
+          </p:cNvPicPr>
+          <p:nvPr/>
+        </p:nvPicPr>
+        <p:blipFill>
+          <a:blip r:embed="rId2"/>
+          <a:stretch>
+            <a:fillRect/>
+          </a:stretch>
+        </p:blipFill>
+        <p:spPr>
+          <a:xfrm>
+            <a:off x="1524000" y="1714500"/>
+            <a:ext cx="9144000" cy="3429000"/>
+          </a:xfrm>
+          <a:prstGeom prst="rect">
+            <a:avLst/>
+          </a:prstGeom>
+        </p:spPr>
+      </p:pic>
+    </p:spTree>
+    <p:extLst>
+      <p:ext uri="{BB962C8B-B14F-4D97-AF65-F5344CB8AC3E}">
+        <p14:creationId xmlns:p14="http://schemas.microsoft.com/office/powerpoint/2010/main" val="2526571630"/>
+      </p:ext>
+    </p:extLst>
+  </p:cSld>
+  <p:clrMapOvr>
+    <a:masterClrMapping/>
+  </p:clrMapOvr>
+</p:sld>
+</file>
+
+<file path=ppt/slides/slide15.xml><?xml version="1.0" encoding="utf-8"?>
+<p:sld xmlns:a="http://schemas.openxmlformats.org/drawingml/2006/main" xmlns:r="http://schemas.openxmlformats.org/officeDocument/2006/relationships" xmlns:p="http://schemas.openxmlformats.org/presentationml/2006/main">
+  <p:cSld>
+    <p:spTree>
+      <p:nvGrpSpPr>
+        <p:cNvPr id="1" name=""/>
+        <p:cNvGrpSpPr/>
+        <p:nvPr/>
+      </p:nvGrpSpPr>
+      <p:grpSpPr>
+        <a:xfrm>
+          <a:off x="0" y="0"/>
+          <a:ext cx="0" cy="0"/>
+          <a:chOff x="0" y="0"/>
+          <a:chExt cx="0" cy="0"/>
+        </a:xfrm>
+      </p:grpSpPr>
+      <p:pic>
+        <p:nvPicPr>
+          <p:cNvPr id="4" name="Picture 3">
+            <a:extLst>
+              <a:ext uri="{FF2B5EF4-FFF2-40B4-BE49-F238E27FC236}">
                 <a16:creationId xmlns:a16="http://schemas.microsoft.com/office/drawing/2014/main" id="{549CAF03-03D5-460C-B463-D99879838D42}"/>
               </a:ext>
             </a:extLst>
@@ -4644,6 +4773,246 @@
 </p:sld>
 </file>
 
+<file path=ppt/slides/slide16.xml><?xml version="1.0" encoding="utf-8"?>
+<p:sld xmlns:a="http://schemas.openxmlformats.org/drawingml/2006/main" xmlns:r="http://schemas.openxmlformats.org/officeDocument/2006/relationships" xmlns:p="http://schemas.openxmlformats.org/presentationml/2006/main">
+  <p:cSld>
+    <p:spTree>
+      <p:nvGrpSpPr>
+        <p:cNvPr id="1" name=""/>
+        <p:cNvGrpSpPr/>
+        <p:nvPr/>
+      </p:nvGrpSpPr>
+      <p:grpSpPr>
+        <a:xfrm>
+          <a:off x="0" y="0"/>
+          <a:ext cx="0" cy="0"/>
+          <a:chOff x="0" y="0"/>
+          <a:chExt cx="0" cy="0"/>
+        </a:xfrm>
+      </p:grpSpPr>
+      <p:pic>
+        <p:nvPicPr>
+          <p:cNvPr id="4" name="Picture 3">
+            <a:extLst>
+              <a:ext uri="{FF2B5EF4-FFF2-40B4-BE49-F238E27FC236}">
+                <a16:creationId xmlns:a16="http://schemas.microsoft.com/office/drawing/2014/main" id="{4D05AF12-23ED-407A-ABE0-FD0BAD21F718}"/>
+              </a:ext>
+            </a:extLst>
+          </p:cNvPr>
+          <p:cNvPicPr>
+            <a:picLocks noChangeAspect="1"/>
+          </p:cNvPicPr>
+          <p:nvPr/>
+        </p:nvPicPr>
+        <p:blipFill>
+          <a:blip r:embed="rId2"/>
+          <a:stretch>
+            <a:fillRect/>
+          </a:stretch>
+        </p:blipFill>
+        <p:spPr>
+          <a:xfrm>
+            <a:off x="1816163" y="0"/>
+            <a:ext cx="8559673" cy="6858000"/>
+          </a:xfrm>
+          <a:prstGeom prst="rect">
+            <a:avLst/>
+          </a:prstGeom>
+        </p:spPr>
+      </p:pic>
+    </p:spTree>
+    <p:extLst>
+      <p:ext uri="{BB962C8B-B14F-4D97-AF65-F5344CB8AC3E}">
+        <p14:creationId xmlns:p14="http://schemas.microsoft.com/office/powerpoint/2010/main" val="4109373593"/>
+      </p:ext>
+    </p:extLst>
+  </p:cSld>
+  <p:clrMapOvr>
+    <a:masterClrMapping/>
+  </p:clrMapOvr>
+</p:sld>
+</file>
+
+<file path=ppt/slides/slide17.xml><?xml version="1.0" encoding="utf-8"?>
+<p:sld xmlns:a="http://schemas.openxmlformats.org/drawingml/2006/main" xmlns:r="http://schemas.openxmlformats.org/officeDocument/2006/relationships" xmlns:p="http://schemas.openxmlformats.org/presentationml/2006/main">
+  <p:cSld>
+    <p:spTree>
+      <p:nvGrpSpPr>
+        <p:cNvPr id="1" name=""/>
+        <p:cNvGrpSpPr/>
+        <p:nvPr/>
+      </p:nvGrpSpPr>
+      <p:grpSpPr>
+        <a:xfrm>
+          <a:off x="0" y="0"/>
+          <a:ext cx="0" cy="0"/>
+          <a:chOff x="0" y="0"/>
+          <a:chExt cx="0" cy="0"/>
+        </a:xfrm>
+      </p:grpSpPr>
+      <p:pic>
+        <p:nvPicPr>
+          <p:cNvPr id="4" name="Picture 3">
+            <a:extLst>
+              <a:ext uri="{FF2B5EF4-FFF2-40B4-BE49-F238E27FC236}">
+                <a16:creationId xmlns:a16="http://schemas.microsoft.com/office/drawing/2014/main" id="{DF66E195-FB69-4DCD-A684-4A602BD51D5C}"/>
+              </a:ext>
+            </a:extLst>
+          </p:cNvPr>
+          <p:cNvPicPr>
+            <a:picLocks noChangeAspect="1"/>
+          </p:cNvPicPr>
+          <p:nvPr/>
+        </p:nvPicPr>
+        <p:blipFill>
+          <a:blip r:embed="rId2"/>
+          <a:stretch>
+            <a:fillRect/>
+          </a:stretch>
+        </p:blipFill>
+        <p:spPr>
+          <a:xfrm>
+            <a:off x="2476500" y="1014412"/>
+            <a:ext cx="7239000" cy="4829175"/>
+          </a:xfrm>
+          <a:prstGeom prst="rect">
+            <a:avLst/>
+          </a:prstGeom>
+        </p:spPr>
+      </p:pic>
+    </p:spTree>
+    <p:extLst>
+      <p:ext uri="{BB962C8B-B14F-4D97-AF65-F5344CB8AC3E}">
+        <p14:creationId xmlns:p14="http://schemas.microsoft.com/office/powerpoint/2010/main" val="2920133129"/>
+      </p:ext>
+    </p:extLst>
+  </p:cSld>
+  <p:clrMapOvr>
+    <a:masterClrMapping/>
+  </p:clrMapOvr>
+</p:sld>
+</file>
+
+<file path=ppt/slides/slide18.xml><?xml version="1.0" encoding="utf-8"?>
+<p:sld xmlns:a="http://schemas.openxmlformats.org/drawingml/2006/main" xmlns:r="http://schemas.openxmlformats.org/officeDocument/2006/relationships" xmlns:p="http://schemas.openxmlformats.org/presentationml/2006/main">
+  <p:cSld>
+    <p:spTree>
+      <p:nvGrpSpPr>
+        <p:cNvPr id="1" name=""/>
+        <p:cNvGrpSpPr/>
+        <p:nvPr/>
+      </p:nvGrpSpPr>
+      <p:grpSpPr>
+        <a:xfrm>
+          <a:off x="0" y="0"/>
+          <a:ext cx="0" cy="0"/>
+          <a:chOff x="0" y="0"/>
+          <a:chExt cx="0" cy="0"/>
+        </a:xfrm>
+      </p:grpSpPr>
+      <p:pic>
+        <p:nvPicPr>
+          <p:cNvPr id="4" name="Picture 3">
+            <a:extLst>
+              <a:ext uri="{FF2B5EF4-FFF2-40B4-BE49-F238E27FC236}">
+                <a16:creationId xmlns:a16="http://schemas.microsoft.com/office/drawing/2014/main" id="{3CAD1A66-FEEB-4B05-AA80-10AD35C1CF3F}"/>
+              </a:ext>
+            </a:extLst>
+          </p:cNvPr>
+          <p:cNvPicPr>
+            <a:picLocks noChangeAspect="1"/>
+          </p:cNvPicPr>
+          <p:nvPr/>
+        </p:nvPicPr>
+        <p:blipFill>
+          <a:blip r:embed="rId2"/>
+          <a:stretch>
+            <a:fillRect/>
+          </a:stretch>
+        </p:blipFill>
+        <p:spPr>
+          <a:xfrm>
+            <a:off x="1366837" y="695325"/>
+            <a:ext cx="9458325" cy="5467350"/>
+          </a:xfrm>
+          <a:prstGeom prst="rect">
+            <a:avLst/>
+          </a:prstGeom>
+        </p:spPr>
+      </p:pic>
+    </p:spTree>
+    <p:extLst>
+      <p:ext uri="{BB962C8B-B14F-4D97-AF65-F5344CB8AC3E}">
+        <p14:creationId xmlns:p14="http://schemas.microsoft.com/office/powerpoint/2010/main" val="3306331696"/>
+      </p:ext>
+    </p:extLst>
+  </p:cSld>
+  <p:clrMapOvr>
+    <a:masterClrMapping/>
+  </p:clrMapOvr>
+</p:sld>
+</file>
+
+<file path=ppt/slides/slide19.xml><?xml version="1.0" encoding="utf-8"?>
+<p:sld xmlns:a="http://schemas.openxmlformats.org/drawingml/2006/main" xmlns:r="http://schemas.openxmlformats.org/officeDocument/2006/relationships" xmlns:p="http://schemas.openxmlformats.org/presentationml/2006/main">
+  <p:cSld>
+    <p:spTree>
+      <p:nvGrpSpPr>
+        <p:cNvPr id="1" name=""/>
+        <p:cNvGrpSpPr/>
+        <p:nvPr/>
+      </p:nvGrpSpPr>
+      <p:grpSpPr>
+        <a:xfrm>
+          <a:off x="0" y="0"/>
+          <a:ext cx="0" cy="0"/>
+          <a:chOff x="0" y="0"/>
+          <a:chExt cx="0" cy="0"/>
+        </a:xfrm>
+      </p:grpSpPr>
+      <p:pic>
+        <p:nvPicPr>
+          <p:cNvPr id="2" name="Picture 1">
+            <a:extLst>
+              <a:ext uri="{FF2B5EF4-FFF2-40B4-BE49-F238E27FC236}">
+                <a16:creationId xmlns:a16="http://schemas.microsoft.com/office/drawing/2014/main" id="{A2E06681-19B6-44EE-ACAF-331FF498C23E}"/>
+              </a:ext>
+            </a:extLst>
+          </p:cNvPr>
+          <p:cNvPicPr>
+            <a:picLocks noChangeAspect="1"/>
+          </p:cNvPicPr>
+          <p:nvPr/>
+        </p:nvPicPr>
+        <p:blipFill>
+          <a:blip r:embed="rId2"/>
+          <a:stretch>
+            <a:fillRect/>
+          </a:stretch>
+        </p:blipFill>
+        <p:spPr>
+          <a:xfrm>
+            <a:off x="161925" y="647700"/>
+            <a:ext cx="11868150" cy="5562600"/>
+          </a:xfrm>
+          <a:prstGeom prst="rect">
+            <a:avLst/>
+          </a:prstGeom>
+        </p:spPr>
+      </p:pic>
+    </p:spTree>
+    <p:extLst>
+      <p:ext uri="{BB962C8B-B14F-4D97-AF65-F5344CB8AC3E}">
+        <p14:creationId xmlns:p14="http://schemas.microsoft.com/office/powerpoint/2010/main" val="1931558257"/>
+      </p:ext>
+    </p:extLst>
+  </p:cSld>
+  <p:clrMapOvr>
+    <a:masterClrMapping/>
+  </p:clrMapOvr>
+</p:sld>
+</file>
+
 <file path=ppt/slides/slide2.xml><?xml version="1.0" encoding="utf-8"?>
 <p:sld xmlns:a="http://schemas.openxmlformats.org/drawingml/2006/main" xmlns:r="http://schemas.openxmlformats.org/officeDocument/2006/relationships" xmlns:p="http://schemas.openxmlformats.org/presentationml/2006/main">
   <p:cSld>
@@ -4695,6 +5064,236 @@
     <p:extLst>
       <p:ext uri="{BB962C8B-B14F-4D97-AF65-F5344CB8AC3E}">
         <p14:creationId xmlns:p14="http://schemas.microsoft.com/office/powerpoint/2010/main" val="3045350577"/>
+      </p:ext>
+    </p:extLst>
+  </p:cSld>
+  <p:clrMapOvr>
+    <a:masterClrMapping/>
+  </p:clrMapOvr>
+</p:sld>
+</file>
+
+<file path=ppt/slides/slide20.xml><?xml version="1.0" encoding="utf-8"?>
+<p:sld xmlns:a="http://schemas.openxmlformats.org/drawingml/2006/main" xmlns:r="http://schemas.openxmlformats.org/officeDocument/2006/relationships" xmlns:p="http://schemas.openxmlformats.org/presentationml/2006/main">
+  <p:cSld>
+    <p:spTree>
+      <p:nvGrpSpPr>
+        <p:cNvPr id="1" name=""/>
+        <p:cNvGrpSpPr/>
+        <p:nvPr/>
+      </p:nvGrpSpPr>
+      <p:grpSpPr>
+        <a:xfrm>
+          <a:off x="0" y="0"/>
+          <a:ext cx="0" cy="0"/>
+          <a:chOff x="0" y="0"/>
+          <a:chExt cx="0" cy="0"/>
+        </a:xfrm>
+      </p:grpSpPr>
+      <p:pic>
+        <p:nvPicPr>
+          <p:cNvPr id="2" name="Picture 1">
+            <a:extLst>
+              <a:ext uri="{FF2B5EF4-FFF2-40B4-BE49-F238E27FC236}">
+                <a16:creationId xmlns:a16="http://schemas.microsoft.com/office/drawing/2014/main" id="{6A9666B9-3262-4677-9120-96F062AD813A}"/>
+              </a:ext>
+            </a:extLst>
+          </p:cNvPr>
+          <p:cNvPicPr>
+            <a:picLocks noChangeAspect="1"/>
+          </p:cNvPicPr>
+          <p:nvPr/>
+        </p:nvPicPr>
+        <p:blipFill>
+          <a:blip r:embed="rId2"/>
+          <a:stretch>
+            <a:fillRect/>
+          </a:stretch>
+        </p:blipFill>
+        <p:spPr>
+          <a:xfrm>
+            <a:off x="2500312" y="409575"/>
+            <a:ext cx="7191375" cy="6038850"/>
+          </a:xfrm>
+          <a:prstGeom prst="rect">
+            <a:avLst/>
+          </a:prstGeom>
+        </p:spPr>
+      </p:pic>
+      <p:pic>
+        <p:nvPicPr>
+          <p:cNvPr id="3" name="Picture 2">
+            <a:extLst>
+              <a:ext uri="{FF2B5EF4-FFF2-40B4-BE49-F238E27FC236}">
+                <a16:creationId xmlns:a16="http://schemas.microsoft.com/office/drawing/2014/main" id="{1E2A82D0-004A-4E24-82DC-5EDAD52B7EDC}"/>
+              </a:ext>
+            </a:extLst>
+          </p:cNvPr>
+          <p:cNvPicPr>
+            <a:picLocks noChangeAspect="1"/>
+          </p:cNvPicPr>
+          <p:nvPr/>
+        </p:nvPicPr>
+        <p:blipFill>
+          <a:blip r:embed="rId3"/>
+          <a:stretch>
+            <a:fillRect/>
+          </a:stretch>
+        </p:blipFill>
+        <p:spPr>
+          <a:xfrm>
+            <a:off x="114300" y="881063"/>
+            <a:ext cx="4416397" cy="1881188"/>
+          </a:xfrm>
+          <a:prstGeom prst="rect">
+            <a:avLst/>
+          </a:prstGeom>
+        </p:spPr>
+      </p:pic>
+    </p:spTree>
+    <p:extLst>
+      <p:ext uri="{BB962C8B-B14F-4D97-AF65-F5344CB8AC3E}">
+        <p14:creationId xmlns:p14="http://schemas.microsoft.com/office/powerpoint/2010/main" val="4125661905"/>
+      </p:ext>
+    </p:extLst>
+  </p:cSld>
+  <p:clrMapOvr>
+    <a:masterClrMapping/>
+  </p:clrMapOvr>
+</p:sld>
+</file>
+
+<file path=ppt/slides/slide21.xml><?xml version="1.0" encoding="utf-8"?>
+<p:sld xmlns:a="http://schemas.openxmlformats.org/drawingml/2006/main" xmlns:r="http://schemas.openxmlformats.org/officeDocument/2006/relationships" xmlns:p="http://schemas.openxmlformats.org/presentationml/2006/main">
+  <p:cSld>
+    <p:spTree>
+      <p:nvGrpSpPr>
+        <p:cNvPr id="1" name=""/>
+        <p:cNvGrpSpPr/>
+        <p:nvPr/>
+      </p:nvGrpSpPr>
+      <p:grpSpPr>
+        <a:xfrm>
+          <a:off x="0" y="0"/>
+          <a:ext cx="0" cy="0"/>
+          <a:chOff x="0" y="0"/>
+          <a:chExt cx="0" cy="0"/>
+        </a:xfrm>
+      </p:grpSpPr>
+      <p:pic>
+        <p:nvPicPr>
+          <p:cNvPr id="2" name="Picture 1">
+            <a:extLst>
+              <a:ext uri="{FF2B5EF4-FFF2-40B4-BE49-F238E27FC236}">
+                <a16:creationId xmlns:a16="http://schemas.microsoft.com/office/drawing/2014/main" id="{AD23C3E5-7F75-4388-B749-23A48E477AE1}"/>
+              </a:ext>
+            </a:extLst>
+          </p:cNvPr>
+          <p:cNvPicPr>
+            <a:picLocks noChangeAspect="1"/>
+          </p:cNvPicPr>
+          <p:nvPr/>
+        </p:nvPicPr>
+        <p:blipFill>
+          <a:blip r:embed="rId2"/>
+          <a:stretch>
+            <a:fillRect/>
+          </a:stretch>
+        </p:blipFill>
+        <p:spPr>
+          <a:xfrm>
+            <a:off x="2686050" y="1771650"/>
+            <a:ext cx="6819900" cy="3314700"/>
+          </a:xfrm>
+          <a:prstGeom prst="rect">
+            <a:avLst/>
+          </a:prstGeom>
+        </p:spPr>
+      </p:pic>
+    </p:spTree>
+    <p:extLst>
+      <p:ext uri="{BB962C8B-B14F-4D97-AF65-F5344CB8AC3E}">
+        <p14:creationId xmlns:p14="http://schemas.microsoft.com/office/powerpoint/2010/main" val="2509763451"/>
+      </p:ext>
+    </p:extLst>
+  </p:cSld>
+  <p:clrMapOvr>
+    <a:masterClrMapping/>
+  </p:clrMapOvr>
+</p:sld>
+</file>
+
+<file path=ppt/slides/slide22.xml><?xml version="1.0" encoding="utf-8"?>
+<p:sld xmlns:a="http://schemas.openxmlformats.org/drawingml/2006/main" xmlns:r="http://schemas.openxmlformats.org/officeDocument/2006/relationships" xmlns:p="http://schemas.openxmlformats.org/presentationml/2006/main">
+  <p:cSld>
+    <p:spTree>
+      <p:nvGrpSpPr>
+        <p:cNvPr id="1" name=""/>
+        <p:cNvGrpSpPr/>
+        <p:nvPr/>
+      </p:nvGrpSpPr>
+      <p:grpSpPr>
+        <a:xfrm>
+          <a:off x="0" y="0"/>
+          <a:ext cx="0" cy="0"/>
+          <a:chOff x="0" y="0"/>
+          <a:chExt cx="0" cy="0"/>
+        </a:xfrm>
+      </p:grpSpPr>
+      <p:sp>
+        <p:nvSpPr>
+          <p:cNvPr id="2" name="Title 1">
+            <a:extLst>
+              <a:ext uri="{FF2B5EF4-FFF2-40B4-BE49-F238E27FC236}">
+                <a16:creationId xmlns:a16="http://schemas.microsoft.com/office/drawing/2014/main" id="{A5C63669-8ED8-4D9D-87D1-D688E92C539C}"/>
+              </a:ext>
+            </a:extLst>
+          </p:cNvPr>
+          <p:cNvSpPr>
+            <a:spLocks noGrp="1"/>
+          </p:cNvSpPr>
+          <p:nvPr>
+            <p:ph type="title"/>
+          </p:nvPr>
+        </p:nvSpPr>
+        <p:spPr/>
+        <p:txBody>
+          <a:bodyPr/>
+          <a:lstStyle/>
+          <a:p>
+            <a:endParaRPr lang="en-US"/>
+          </a:p>
+        </p:txBody>
+      </p:sp>
+      <p:sp>
+        <p:nvSpPr>
+          <p:cNvPr id="3" name="Content Placeholder 2">
+            <a:extLst>
+              <a:ext uri="{FF2B5EF4-FFF2-40B4-BE49-F238E27FC236}">
+                <a16:creationId xmlns:a16="http://schemas.microsoft.com/office/drawing/2014/main" id="{A1860D3A-EAD7-444D-8634-C1CE2FEB0122}"/>
+              </a:ext>
+            </a:extLst>
+          </p:cNvPr>
+          <p:cNvSpPr>
+            <a:spLocks noGrp="1"/>
+          </p:cNvSpPr>
+          <p:nvPr>
+            <p:ph idx="1"/>
+          </p:nvPr>
+        </p:nvSpPr>
+        <p:spPr/>
+        <p:txBody>
+          <a:bodyPr/>
+          <a:lstStyle/>
+          <a:p>
+            <a:endParaRPr lang="en-US"/>
+          </a:p>
+        </p:txBody>
+      </p:sp>
+    </p:spTree>
+    <p:extLst>
+      <p:ext uri="{BB962C8B-B14F-4D97-AF65-F5344CB8AC3E}">
+        <p14:creationId xmlns:p14="http://schemas.microsoft.com/office/powerpoint/2010/main" val="3842200701"/>
       </p:ext>
     </p:extLst>
   </p:cSld>

</xml_diff>